<commit_message>
adding practical 4 solutions, practical 5
</commit_message>
<xml_diff>
--- a/Chanco_STA6206_BDA_2019_Henrion_Practical4.pptx
+++ b/Chanco_STA6206_BDA_2019_Henrion_Practical4.pptx
@@ -12,8 +12,6 @@
     <p:sldId id="260" r:id="rId6"/>
     <p:sldId id="261" r:id="rId7"/>
     <p:sldId id="262" r:id="rId8"/>
-    <p:sldId id="263" r:id="rId9"/>
-    <p:sldId id="264" r:id="rId10"/>
   </p:sldIdLst>
   <p:sldSz cx="12192000" cy="6858000"/>
   <p:notesSz cx="6858000" cy="9144000"/>
@@ -5278,487 +5276,6 @@
       </p:grpSpPr>
       <p:sp>
         <p:nvSpPr>
-          <p:cNvPr id="2" name="Title 1">
-            <a:extLst>
-              <a:ext uri="{FF2B5EF4-FFF2-40B4-BE49-F238E27FC236}">
-                <a16:creationId xmlns:a16="http://schemas.microsoft.com/office/drawing/2014/main" id="{D6AA89D5-560C-4369-A313-7C24EDF028A0}"/>
-              </a:ext>
-            </a:extLst>
-          </p:cNvPr>
-          <p:cNvSpPr>
-            <a:spLocks noGrp="1"/>
-          </p:cNvSpPr>
-          <p:nvPr>
-            <p:ph type="title"/>
-          </p:nvPr>
-        </p:nvSpPr>
-        <p:spPr/>
-        <p:txBody>
-          <a:bodyPr/>
-          <a:lstStyle/>
-          <a:p>
-            <a:pPr lvl="0" marL="0" indent="0">
-              <a:buNone/>
-            </a:pPr>
-            <a:r>
-              <a:rPr/>
-              <a:t>Exercise</a:t>
-            </a:r>
-            <a:r>
-              <a:rPr/>
-              <a:t> </a:t>
-            </a:r>
-            <a:r>
-              <a:rPr/>
-              <a:t>2</a:t>
-            </a:r>
-          </a:p>
-        </p:txBody>
-      </p:sp>
-      <mc:AlternateContent xmlns:mc="http://schemas.openxmlformats.org/markup-compatibility/2006">
-        <mc:Choice xmlns:a14="http://schemas.microsoft.com/office/drawing/2010/main" Requires="a14">
-          <p:sp>
-            <p:nvSpPr>
-              <p:cNvPr id="3" name="Content Placeholder 2">
-                <a:extLst>
-                  <a:ext uri="{FF2B5EF4-FFF2-40B4-BE49-F238E27FC236}">
-                    <a16:creationId xmlns:a16="http://schemas.microsoft.com/office/drawing/2014/main" id="{288BC91F-1C76-43AE-8B2A-956D48B768BE}"/>
-                  </a:ext>
-                </a:extLst>
-              </p:cNvPr>
-              <p:cNvSpPr>
-                <a:spLocks noGrp="1"/>
-              </p:cNvSpPr>
-              <p:nvPr>
-                <p:ph idx="1"/>
-              </p:nvPr>
-            </p:nvSpPr>
-            <p:spPr/>
-            <p:txBody>
-              <a:bodyPr/>
-              <a:lstStyle/>
-              <a:p>
-                <a:pPr lvl="0" marL="0" indent="0">
-                  <a:buNone/>
-                </a:pPr>
-                <a14:m>
-                  <m:oMathPara xmlns:m="http://schemas.openxmlformats.org/officeDocument/2006/math">
-                    <m:oMathParaPr>
-                      <m:jc m:val="center"/>
-                    </m:oMathParaPr>
-                    <m:oMath>
-                      <m:r>
-                        <m:t> </m:t>
-                      </m:r>
-                    </m:oMath>
-                  </m:oMathPara>
-                </a14:m>
-              </a:p>
-              <a:p>
-                <a:pPr lvl="0" marL="0" indent="0">
-                  <a:buNone/>
-                </a:pPr>
-                <a:r>
-                  <a:rPr/>
-                  <a:t>Fit the model from Practical 3, Exercise 2 using JAGS and the </a:t>
-                </a:r>
-                <a:r>
-                  <a:rPr sz="1800">
-                    <a:latin typeface="Courier"/>
-                  </a:rPr>
-                  <a:t>rjags</a:t>
-                </a:r>
-                <a:r>
-                  <a:rPr/>
-                  <a:t> package.</a:t>
-                </a:r>
-              </a:p>
-              <a:p>
-                <a:pPr lvl="0" marL="0" indent="0">
-                  <a:buNone/>
-                </a:pPr>
-                <a14:m>
-                  <m:oMathPara xmlns:m="http://schemas.openxmlformats.org/officeDocument/2006/math">
-                    <m:oMathParaPr>
-                      <m:jc m:val="center"/>
-                    </m:oMathParaPr>
-                    <m:oMath>
-                      <m:r>
-                        <m:t> </m:t>
-                      </m:r>
-                    </m:oMath>
-                  </m:oMathPara>
-                </a14:m>
-              </a:p>
-              <a:p>
-                <a:pPr lvl="0" marL="0" indent="0">
-                  <a:buNone/>
-                </a:pPr>
-                <a:r>
-                  <a:rPr/>
-                  <a:t>Inspect the trace plot and plot the posterior distribution.</a:t>
-                </a:r>
-              </a:p>
-              <a:p>
-                <a:pPr lvl="0" marL="0" indent="0">
-                  <a:buNone/>
-                </a:pPr>
-                <a14:m>
-                  <m:oMathPara xmlns:m="http://schemas.openxmlformats.org/officeDocument/2006/math">
-                    <m:oMathParaPr>
-                      <m:jc m:val="center"/>
-                    </m:oMathParaPr>
-                    <m:oMath>
-                      <m:r>
-                        <m:t> </m:t>
-                      </m:r>
-                    </m:oMath>
-                  </m:oMathPara>
-                </a14:m>
-              </a:p>
-              <a:p>
-                <a:pPr lvl="0" marL="0" indent="0">
-                  <a:buNone/>
-                </a:pPr>
-                <a:r>
-                  <a:rPr/>
-                  <a:t>Compute the posterior mean and the quantile-based 95% Bayesian confidence interval.</a:t>
-                </a:r>
-              </a:p>
-            </p:txBody>
-          </p:sp>
-        </mc:Choice>
-      </mc:AlternateContent>
-    </p:spTree>
-  </p:cSld>
-</p:sld>
-</file>
-
-<file path=ppt/slides/slide8.xml><?xml version="1.0" encoding="utf-8"?>
-<p:sld xmlns:a="http://schemas.openxmlformats.org/drawingml/2006/main" xmlns:r="http://schemas.openxmlformats.org/officeDocument/2006/relationships" xmlns:p="http://schemas.openxmlformats.org/presentationml/2006/main">
-  <p:cSld>
-    <p:spTree>
-      <p:nvGrpSpPr>
-        <p:cNvPr id="1" name=""/>
-        <p:cNvGrpSpPr/>
-        <p:nvPr/>
-      </p:nvGrpSpPr>
-      <p:grpSpPr>
-        <a:xfrm>
-          <a:off x="0" y="0"/>
-          <a:ext cx="0" cy="0"/>
-          <a:chOff x="0" y="0"/>
-          <a:chExt cx="0" cy="0"/>
-        </a:xfrm>
-      </p:grpSpPr>
-      <p:sp>
-        <p:nvSpPr>
-          <p:cNvPr id="2" name="Title 1">
-            <a:extLst>
-              <a:ext uri="{FF2B5EF4-FFF2-40B4-BE49-F238E27FC236}">
-                <a16:creationId xmlns:a16="http://schemas.microsoft.com/office/drawing/2014/main" id="{D6AA89D5-560C-4369-A313-7C24EDF028A0}"/>
-              </a:ext>
-            </a:extLst>
-          </p:cNvPr>
-          <p:cNvSpPr>
-            <a:spLocks noGrp="1"/>
-          </p:cNvSpPr>
-          <p:nvPr>
-            <p:ph type="title"/>
-          </p:nvPr>
-        </p:nvSpPr>
-        <p:spPr/>
-        <p:txBody>
-          <a:bodyPr/>
-          <a:lstStyle/>
-          <a:p>
-            <a:pPr lvl="0" marL="0" indent="0">
-              <a:buNone/>
-            </a:pPr>
-            <a:r>
-              <a:rPr/>
-              <a:t>Exercise</a:t>
-            </a:r>
-            <a:r>
-              <a:rPr/>
-              <a:t> </a:t>
-            </a:r>
-            <a:r>
-              <a:rPr/>
-              <a:t>3</a:t>
-            </a:r>
-          </a:p>
-        </p:txBody>
-      </p:sp>
-      <mc:AlternateContent xmlns:mc="http://schemas.openxmlformats.org/markup-compatibility/2006">
-        <mc:Choice xmlns:a14="http://schemas.microsoft.com/office/drawing/2010/main" Requires="a14">
-          <p:sp>
-            <p:nvSpPr>
-              <p:cNvPr id="3" name="Content Placeholder 2">
-                <a:extLst>
-                  <a:ext uri="{FF2B5EF4-FFF2-40B4-BE49-F238E27FC236}">
-                    <a16:creationId xmlns:a16="http://schemas.microsoft.com/office/drawing/2014/main" id="{288BC91F-1C76-43AE-8B2A-956D48B768BE}"/>
-                  </a:ext>
-                </a:extLst>
-              </p:cNvPr>
-              <p:cNvSpPr>
-                <a:spLocks noGrp="1"/>
-              </p:cNvSpPr>
-              <p:nvPr>
-                <p:ph idx="1"/>
-              </p:nvPr>
-            </p:nvSpPr>
-            <p:spPr/>
-            <p:txBody>
-              <a:bodyPr/>
-              <a:lstStyle/>
-              <a:p>
-                <a:pPr lvl="0" marL="0" indent="0">
-                  <a:buNone/>
-                </a:pPr>
-                <a14:m>
-                  <m:oMathPara xmlns:m="http://schemas.openxmlformats.org/officeDocument/2006/math">
-                    <m:oMathParaPr>
-                      <m:jc m:val="center"/>
-                    </m:oMathParaPr>
-                    <m:oMath>
-                      <m:r>
-                        <m:t> </m:t>
-                      </m:r>
-                    </m:oMath>
-                  </m:oMathPara>
-                </a14:m>
-              </a:p>
-              <a:p>
-                <a:pPr lvl="0" marL="0" indent="0">
-                  <a:buNone/>
-                </a:pPr>
-                <a:r>
-                  <a:rPr/>
-                  <a:t>Fit the model from Practical 3, Exercise 3 using JAGS and the </a:t>
-                </a:r>
-                <a:r>
-                  <a:rPr sz="1800">
-                    <a:latin typeface="Courier"/>
-                  </a:rPr>
-                  <a:t>rjags</a:t>
-                </a:r>
-                <a:r>
-                  <a:rPr/>
-                  <a:t> package. Use this as the data from the sampling model:</a:t>
-                </a:r>
-              </a:p>
-              <a:p>
-                <a:pPr lvl="0" marL="0" indent="0">
-                  <a:buNone/>
-                </a:pPr>
-                <a14:m>
-                  <m:oMathPara xmlns:m="http://schemas.openxmlformats.org/officeDocument/2006/math">
-                    <m:oMathParaPr>
-                      <m:jc m:val="center"/>
-                    </m:oMathParaPr>
-                    <m:oMath>
-                      <m:r>
-                        <m:t>y</m:t>
-                      </m:r>
-                      <m:r>
-                        <m:t>=</m:t>
-                      </m:r>
-                      <m:r>
-                        <m:t>(</m:t>
-                      </m:r>
-                      <m:r>
-                        <m:t>1</m:t>
-                      </m:r>
-                      <m:r>
-                        <m:t>,</m:t>
-                      </m:r>
-                      <m:r>
-                        <m:t>3</m:t>
-                      </m:r>
-                      <m:r>
-                        <m:t>,</m:t>
-                      </m:r>
-                      <m:r>
-                        <m:t>2</m:t>
-                      </m:r>
-                      <m:r>
-                        <m:t>,</m:t>
-                      </m:r>
-                      <m:r>
-                        <m:t>3</m:t>
-                      </m:r>
-                      <m:r>
-                        <m:t>,</m:t>
-                      </m:r>
-                      <m:r>
-                        <m:t>0</m:t>
-                      </m:r>
-                      <m:r>
-                        <m:t>,</m:t>
-                      </m:r>
-                      <m:r>
-                        <m:t>2</m:t>
-                      </m:r>
-                      <m:r>
-                        <m:t>,</m:t>
-                      </m:r>
-                      <m:r>
-                        <m:t>6</m:t>
-                      </m:r>
-                      <m:r>
-                        <m:t>,</m:t>
-                      </m:r>
-                      <m:r>
-                        <m:t>4</m:t>
-                      </m:r>
-                      <m:r>
-                        <m:t>,</m:t>
-                      </m:r>
-                      <m:r>
-                        <m:t>4</m:t>
-                      </m:r>
-                      <m:r>
-                        <m:t>,</m:t>
-                      </m:r>
-                      <m:r>
-                        <m:t>1</m:t>
-                      </m:r>
-                      <m:r>
-                        <m:t>,</m:t>
-                      </m:r>
-                      <m:r>
-                        <m:t>1</m:t>
-                      </m:r>
-                      <m:r>
-                        <m:t>,</m:t>
-                      </m:r>
-                      <m:r>
-                        <m:t>3</m:t>
-                      </m:r>
-                      <m:r>
-                        <m:t>,</m:t>
-                      </m:r>
-                      <m:r>
-                        <m:t>2</m:t>
-                      </m:r>
-                      <m:r>
-                        <m:t>,</m:t>
-                      </m:r>
-                      <m:r>
-                        <m:t>3</m:t>
-                      </m:r>
-                      <m:r>
-                        <m:t>,</m:t>
-                      </m:r>
-                      <m:r>
-                        <m:t>1</m:t>
-                      </m:r>
-                      <m:r>
-                        <m:t>,</m:t>
-                      </m:r>
-                      <m:r>
-                        <m:t>1</m:t>
-                      </m:r>
-                      <m:r>
-                        <m:t>,</m:t>
-                      </m:r>
-                      <m:r>
-                        <m:t>3</m:t>
-                      </m:r>
-                      <m:r>
-                        <m:t>,</m:t>
-                      </m:r>
-                      <m:r>
-                        <m:t>0</m:t>
-                      </m:r>
-                      <m:r>
-                        <m:t>)</m:t>
-                      </m:r>
-                    </m:oMath>
-                  </m:oMathPara>
-                </a14:m>
-              </a:p>
-              <a:p>
-                <a:pPr lvl="0" marL="0" indent="0">
-                  <a:buNone/>
-                </a:pPr>
-                <a14:m>
-                  <m:oMathPara xmlns:m="http://schemas.openxmlformats.org/officeDocument/2006/math">
-                    <m:oMathParaPr>
-                      <m:jc m:val="center"/>
-                    </m:oMathParaPr>
-                    <m:oMath>
-                      <m:r>
-                        <m:t> </m:t>
-                      </m:r>
-                    </m:oMath>
-                  </m:oMathPara>
-                </a14:m>
-              </a:p>
-              <a:p>
-                <a:pPr lvl="0" marL="0" indent="0">
-                  <a:buNone/>
-                </a:pPr>
-                <a:r>
-                  <a:rPr/>
-                  <a:t>Inspect the trace plot and plot the posterior distribution.</a:t>
-                </a:r>
-              </a:p>
-              <a:p>
-                <a:pPr lvl="0" marL="0" indent="0">
-                  <a:buNone/>
-                </a:pPr>
-                <a14:m>
-                  <m:oMathPara xmlns:m="http://schemas.openxmlformats.org/officeDocument/2006/math">
-                    <m:oMathParaPr>
-                      <m:jc m:val="center"/>
-                    </m:oMathParaPr>
-                    <m:oMath>
-                      <m:r>
-                        <m:t> </m:t>
-                      </m:r>
-                    </m:oMath>
-                  </m:oMathPara>
-                </a14:m>
-              </a:p>
-              <a:p>
-                <a:pPr lvl="0" marL="0" indent="0">
-                  <a:buNone/>
-                </a:pPr>
-                <a:r>
-                  <a:rPr/>
-                  <a:t>Compute the posterior mean and the quantile-based 95% Bayesian confidence interval.</a:t>
-                </a:r>
-              </a:p>
-            </p:txBody>
-          </p:sp>
-        </mc:Choice>
-      </mc:AlternateContent>
-    </p:spTree>
-  </p:cSld>
-</p:sld>
-</file>
-
-<file path=ppt/slides/slide9.xml><?xml version="1.0" encoding="utf-8"?>
-<p:sld xmlns:a="http://schemas.openxmlformats.org/drawingml/2006/main" xmlns:r="http://schemas.openxmlformats.org/officeDocument/2006/relationships" xmlns:p="http://schemas.openxmlformats.org/presentationml/2006/main">
-  <p:cSld>
-    <p:spTree>
-      <p:nvGrpSpPr>
-        <p:cNvPr id="1" name=""/>
-        <p:cNvGrpSpPr/>
-        <p:nvPr/>
-      </p:nvGrpSpPr>
-      <p:grpSpPr>
-        <a:xfrm>
-          <a:off x="0" y="0"/>
-          <a:ext cx="0" cy="0"/>
-          <a:chOff x="0" y="0"/>
-          <a:chExt cx="0" cy="0"/>
-        </a:xfrm>
-      </p:grpSpPr>
-      <p:sp>
-        <p:nvSpPr>
           <p:cNvPr id="3" name="Content Placeholder 2">
             <a:extLst>
               <a:ext uri="{FF2B5EF4-FFF2-40B4-BE49-F238E27FC236}">

</xml_diff>